<commit_message>
GCSE 9-1 Computer Science course
GCSE 9-1 Computer Science Unit 1. 
Contact me so that we get started tutoring.
</commit_message>
<xml_diff>
--- a/Computer Science GCSE(9-1) (2).pptx
+++ b/Computer Science GCSE(9-1) (2).pptx
@@ -5,7 +5,7 @@
     <p:sldMasterId id="2147483660" r:id="rId4"/>
   </p:sldMasterIdLst>
   <p:notesMasterIdLst>
-    <p:notesMasterId r:id="rId20"/>
+    <p:notesMasterId r:id="rId26"/>
   </p:notesMasterIdLst>
   <p:sldIdLst>
     <p:sldId id="278" r:id="rId5"/>
@@ -23,6 +23,12 @@
     <p:sldId id="290" r:id="rId17"/>
     <p:sldId id="291" r:id="rId18"/>
     <p:sldId id="292" r:id="rId19"/>
+    <p:sldId id="293" r:id="rId20"/>
+    <p:sldId id="294" r:id="rId21"/>
+    <p:sldId id="295" r:id="rId22"/>
+    <p:sldId id="296" r:id="rId23"/>
+    <p:sldId id="297" r:id="rId24"/>
+    <p:sldId id="298" r:id="rId25"/>
   </p:sldIdLst>
   <p:sldSz cx="12192000" cy="6858000"/>
   <p:notesSz cx="6858000" cy="9144000"/>
@@ -127,14 +133,6 @@
     </p:ext>
   </p:extLst>
 </p:presentation>
-</file>
-
-<file path=ppt/revisionInfo.xml><?xml version="1.0" encoding="utf-8"?>
-<p1510:revInfo xmlns:a="http://schemas.openxmlformats.org/drawingml/2006/main" xmlns:r="http://schemas.openxmlformats.org/officeDocument/2006/relationships" xmlns:p1510="http://schemas.microsoft.com/office/powerpoint/2015/10/main">
-  <p1510:revLst>
-    <p1510:client id="{4892AE1E-2E3B-4BDC-A980-CE34A66DF954}" v="2" dt="2022-07-02T13:10:54.655"/>
-  </p1510:revLst>
-</p1510:revInfo>
 </file>
 
 <file path=ppt/notesMasters/notesMaster1.xml><?xml version="1.0" encoding="utf-8"?>
@@ -6499,7 +6497,7 @@
           </a:effectLst>
           <a:extLst>
             <a:ext uri="{91240B29-F687-4f45-9708-019B960494DF}">
-              <a14:hiddenLine xmlns="" xmlns:a14="http://schemas.microsoft.com/office/drawing/2010/main" xmlns:p14="http://schemas.microsoft.com/office/powerpoint/2010/main" xmlns:a16="http://schemas.microsoft.com/office/drawing/2014/main" w="9525">
+              <a14:hiddenLine xmlns:a16="http://schemas.microsoft.com/office/drawing/2014/main" xmlns:p14="http://schemas.microsoft.com/office/powerpoint/2010/main" xmlns:a14="http://schemas.microsoft.com/office/drawing/2010/main" xmlns="" w="9525">
                 <a:solidFill>
                   <a:srgbClr val="000000"/>
                 </a:solidFill>
@@ -7495,11 +7493,7 @@
           <a:p>
             <a:r>
               <a:rPr lang="en-US" dirty="0"/>
-              <a:t>3. Sorting and </a:t>
-            </a:r>
-            <a:r>
-              <a:rPr lang="en-US"/>
-              <a:t>Searching Algorithms</a:t>
+              <a:t>3. Sorting and Searching Algorithms</a:t>
             </a:r>
           </a:p>
         </p:txBody>
@@ -7525,7 +7519,23 @@
           <a:bodyPr/>
           <a:lstStyle/>
           <a:p>
-            <a:endParaRPr lang="en-US"/>
+            <a:r>
+              <a:rPr lang="en-GB" dirty="0"/>
+              <a:t>Understand how bubble sort, merge sort, linear search and binary search algorithms work</a:t>
+            </a:r>
+          </a:p>
+          <a:p>
+            <a:r>
+              <a:rPr lang="en-GB" dirty="0"/>
+              <a:t>Understand how the choice of algorithm is influenced by the data structures and data values that need to be manipulated</a:t>
+            </a:r>
+          </a:p>
+          <a:p>
+            <a:r>
+              <a:rPr lang="en-GB" dirty="0"/>
+              <a:t>Evaluate the fitness for purpose of algorithms in meeting specified requirements efficiently, using logical reasoning and test data.  </a:t>
+            </a:r>
+            <a:endParaRPr lang="en-US" dirty="0"/>
           </a:p>
         </p:txBody>
       </p:sp>
@@ -7533,6 +7543,469 @@
     <p:extLst>
       <p:ext uri="{BB962C8B-B14F-4D97-AF65-F5344CB8AC3E}">
         <p14:creationId xmlns:p14="http://schemas.microsoft.com/office/powerpoint/2010/main" val="1034785628"/>
+      </p:ext>
+    </p:extLst>
+  </p:cSld>
+  <p:clrMapOvr>
+    <a:masterClrMapping/>
+  </p:clrMapOvr>
+</p:sld>
+</file>
+
+<file path=ppt/slides/slide16.xml><?xml version="1.0" encoding="utf-8"?>
+<p:sld xmlns:a="http://schemas.openxmlformats.org/drawingml/2006/main" xmlns:r="http://schemas.openxmlformats.org/officeDocument/2006/relationships" xmlns:p="http://schemas.openxmlformats.org/presentationml/2006/main">
+  <p:cSld>
+    <p:spTree>
+      <p:nvGrpSpPr>
+        <p:cNvPr id="1" name=""/>
+        <p:cNvGrpSpPr/>
+        <p:nvPr/>
+      </p:nvGrpSpPr>
+      <p:grpSpPr>
+        <a:xfrm>
+          <a:off x="0" y="0"/>
+          <a:ext cx="0" cy="0"/>
+          <a:chOff x="0" y="0"/>
+          <a:chExt cx="0" cy="0"/>
+        </a:xfrm>
+      </p:grpSpPr>
+      <p:sp>
+        <p:nvSpPr>
+          <p:cNvPr id="2" name="Title 1">
+            <a:extLst>
+              <a:ext uri="{FF2B5EF4-FFF2-40B4-BE49-F238E27FC236}">
+                <a16:creationId xmlns:a16="http://schemas.microsoft.com/office/drawing/2014/main" id="{925075CE-671F-0B35-1414-31662EC5A103}"/>
+              </a:ext>
+            </a:extLst>
+          </p:cNvPr>
+          <p:cNvSpPr>
+            <a:spLocks noGrp="1"/>
+          </p:cNvSpPr>
+          <p:nvPr>
+            <p:ph type="title"/>
+          </p:nvPr>
+        </p:nvSpPr>
+        <p:spPr/>
+        <p:txBody>
+          <a:bodyPr>
+            <a:normAutofit/>
+          </a:bodyPr>
+          <a:lstStyle/>
+          <a:p>
+            <a:r>
+              <a:rPr lang="en-GB" dirty="0"/>
+              <a:t>Bubble sort</a:t>
+            </a:r>
+            <a:endParaRPr lang="en-US" dirty="0"/>
+          </a:p>
+        </p:txBody>
+      </p:sp>
+      <p:sp>
+        <p:nvSpPr>
+          <p:cNvPr id="3" name="Content Placeholder 2">
+            <a:extLst>
+              <a:ext uri="{FF2B5EF4-FFF2-40B4-BE49-F238E27FC236}">
+                <a16:creationId xmlns:a16="http://schemas.microsoft.com/office/drawing/2014/main" id="{053BF71C-5A00-E950-B86E-1C13E601191F}"/>
+              </a:ext>
+            </a:extLst>
+          </p:cNvPr>
+          <p:cNvSpPr>
+            <a:spLocks noGrp="1"/>
+          </p:cNvSpPr>
+          <p:nvPr>
+            <p:ph idx="1"/>
+          </p:nvPr>
+        </p:nvSpPr>
+        <p:spPr/>
+        <p:txBody>
+          <a:bodyPr/>
+          <a:lstStyle/>
+          <a:p>
+            <a:r>
+              <a:rPr lang="en-GB" dirty="0"/>
+              <a:t>Start at the beginning of the list.</a:t>
+            </a:r>
+          </a:p>
+          <a:p>
+            <a:r>
+              <a:rPr lang="en-GB" dirty="0"/>
+              <a:t>Compare the values in position 1 and position 2 in the list – if they are not in ascending (descending) order then swap them. </a:t>
+            </a:r>
+          </a:p>
+          <a:p>
+            <a:r>
+              <a:rPr lang="en-GB" dirty="0"/>
+              <a:t>Compare the values in position 2 and position 3 in the list and swap if necessary.</a:t>
+            </a:r>
+          </a:p>
+          <a:p>
+            <a:r>
+              <a:rPr lang="en-GB" dirty="0"/>
+              <a:t>Continue to the end of the list.</a:t>
+            </a:r>
+          </a:p>
+          <a:p>
+            <a:r>
+              <a:rPr lang="en-GB" dirty="0"/>
+              <a:t>If there have been any swaps, repeat steps 1 to 4.</a:t>
+            </a:r>
+            <a:endParaRPr lang="en-US" dirty="0"/>
+          </a:p>
+          <a:p>
+            <a:r>
+              <a:rPr lang="en-US" dirty="0"/>
+              <a:t>Homework : Exercise : Bubble sort flowchart</a:t>
+            </a:r>
+            <a:endParaRPr lang="en-GB" dirty="0"/>
+          </a:p>
+        </p:txBody>
+      </p:sp>
+    </p:spTree>
+    <p:extLst>
+      <p:ext uri="{BB962C8B-B14F-4D97-AF65-F5344CB8AC3E}">
+        <p14:creationId xmlns:p14="http://schemas.microsoft.com/office/powerpoint/2010/main" val="3374779006"/>
+      </p:ext>
+    </p:extLst>
+  </p:cSld>
+  <p:clrMapOvr>
+    <a:masterClrMapping/>
+  </p:clrMapOvr>
+</p:sld>
+</file>
+
+<file path=ppt/slides/slide17.xml><?xml version="1.0" encoding="utf-8"?>
+<p:sld xmlns:a="http://schemas.openxmlformats.org/drawingml/2006/main" xmlns:r="http://schemas.openxmlformats.org/officeDocument/2006/relationships" xmlns:p="http://schemas.openxmlformats.org/presentationml/2006/main">
+  <p:cSld>
+    <p:spTree>
+      <p:nvGrpSpPr>
+        <p:cNvPr id="1" name=""/>
+        <p:cNvGrpSpPr/>
+        <p:nvPr/>
+      </p:nvGrpSpPr>
+      <p:grpSpPr>
+        <a:xfrm>
+          <a:off x="0" y="0"/>
+          <a:ext cx="0" cy="0"/>
+          <a:chOff x="0" y="0"/>
+          <a:chExt cx="0" cy="0"/>
+        </a:xfrm>
+      </p:grpSpPr>
+      <p:sp>
+        <p:nvSpPr>
+          <p:cNvPr id="2" name="Title 1">
+            <a:extLst>
+              <a:ext uri="{FF2B5EF4-FFF2-40B4-BE49-F238E27FC236}">
+                <a16:creationId xmlns:a16="http://schemas.microsoft.com/office/drawing/2014/main" id="{091EC0A6-E63D-CFE4-29E1-6BD188463E4C}"/>
+              </a:ext>
+            </a:extLst>
+          </p:cNvPr>
+          <p:cNvSpPr>
+            <a:spLocks noGrp="1"/>
+          </p:cNvSpPr>
+          <p:nvPr>
+            <p:ph type="title"/>
+          </p:nvPr>
+        </p:nvSpPr>
+        <p:spPr/>
+        <p:txBody>
+          <a:bodyPr/>
+          <a:lstStyle/>
+          <a:p>
+            <a:r>
+              <a:rPr lang="en-GB" dirty="0"/>
+              <a:t>Merge sort</a:t>
+            </a:r>
+            <a:endParaRPr lang="en-US" dirty="0"/>
+          </a:p>
+        </p:txBody>
+      </p:sp>
+      <p:sp>
+        <p:nvSpPr>
+          <p:cNvPr id="3" name="Content Placeholder 2">
+            <a:extLst>
+              <a:ext uri="{FF2B5EF4-FFF2-40B4-BE49-F238E27FC236}">
+                <a16:creationId xmlns:a16="http://schemas.microsoft.com/office/drawing/2014/main" id="{32C77CA1-B275-60CF-7278-E306316EC179}"/>
+              </a:ext>
+            </a:extLst>
+          </p:cNvPr>
+          <p:cNvSpPr>
+            <a:spLocks noGrp="1"/>
+          </p:cNvSpPr>
+          <p:nvPr>
+            <p:ph idx="1"/>
+          </p:nvPr>
+        </p:nvSpPr>
+        <p:spPr/>
+        <p:txBody>
+          <a:bodyPr/>
+          <a:lstStyle/>
+          <a:p>
+            <a:r>
+              <a:rPr lang="en-GB" dirty="0"/>
+              <a:t>Divide a list into smaller lists</a:t>
+            </a:r>
+          </a:p>
+          <a:p>
+            <a:r>
+              <a:rPr lang="en-GB" dirty="0"/>
+              <a:t>Divide these until the size of each list is on</a:t>
+            </a:r>
+          </a:p>
+          <a:p>
+            <a:r>
+              <a:rPr lang="en-GB" dirty="0"/>
+              <a:t>Recursion is the method to the previous application of the method. </a:t>
+            </a:r>
+          </a:p>
+          <a:p>
+            <a:r>
+              <a:rPr lang="en-GB" dirty="0"/>
+              <a:t>The difference between bubble and merge sort is the fact that bubble sort uses brute force, whereas merge sort uses divide and conquer methods to sort the items in a list.</a:t>
+            </a:r>
+            <a:endParaRPr lang="en-US" dirty="0"/>
+          </a:p>
+        </p:txBody>
+      </p:sp>
+    </p:spTree>
+    <p:extLst>
+      <p:ext uri="{BB962C8B-B14F-4D97-AF65-F5344CB8AC3E}">
+        <p14:creationId xmlns:p14="http://schemas.microsoft.com/office/powerpoint/2010/main" val="1102970160"/>
+      </p:ext>
+    </p:extLst>
+  </p:cSld>
+  <p:clrMapOvr>
+    <a:masterClrMapping/>
+  </p:clrMapOvr>
+</p:sld>
+</file>
+
+<file path=ppt/slides/slide18.xml><?xml version="1.0" encoding="utf-8"?>
+<p:sld xmlns:a="http://schemas.openxmlformats.org/drawingml/2006/main" xmlns:r="http://schemas.openxmlformats.org/officeDocument/2006/relationships" xmlns:p="http://schemas.openxmlformats.org/presentationml/2006/main">
+  <p:cSld>
+    <p:spTree>
+      <p:nvGrpSpPr>
+        <p:cNvPr id="1" name=""/>
+        <p:cNvGrpSpPr/>
+        <p:nvPr/>
+      </p:nvGrpSpPr>
+      <p:grpSpPr>
+        <a:xfrm>
+          <a:off x="0" y="0"/>
+          <a:ext cx="0" cy="0"/>
+          <a:chOff x="0" y="0"/>
+          <a:chExt cx="0" cy="0"/>
+        </a:xfrm>
+      </p:grpSpPr>
+      <p:sp>
+        <p:nvSpPr>
+          <p:cNvPr id="2" name="Title 1">
+            <a:extLst>
+              <a:ext uri="{FF2B5EF4-FFF2-40B4-BE49-F238E27FC236}">
+                <a16:creationId xmlns:a16="http://schemas.microsoft.com/office/drawing/2014/main" id="{F374F841-363F-ED78-D128-A97E9A6936B0}"/>
+              </a:ext>
+            </a:extLst>
+          </p:cNvPr>
+          <p:cNvSpPr>
+            <a:spLocks noGrp="1"/>
+          </p:cNvSpPr>
+          <p:nvPr>
+            <p:ph type="title"/>
+          </p:nvPr>
+        </p:nvSpPr>
+        <p:spPr/>
+        <p:txBody>
+          <a:bodyPr/>
+          <a:lstStyle/>
+          <a:p>
+            <a:r>
+              <a:rPr lang="en-GB" dirty="0"/>
+              <a:t>Linear search</a:t>
+            </a:r>
+            <a:endParaRPr lang="en-US" dirty="0"/>
+          </a:p>
+        </p:txBody>
+      </p:sp>
+      <p:sp>
+        <p:nvSpPr>
+          <p:cNvPr id="3" name="Content Placeholder 2">
+            <a:extLst>
+              <a:ext uri="{FF2B5EF4-FFF2-40B4-BE49-F238E27FC236}">
+                <a16:creationId xmlns:a16="http://schemas.microsoft.com/office/drawing/2014/main" id="{87581E34-F522-9F22-F70A-5C36A4678E96}"/>
+              </a:ext>
+            </a:extLst>
+          </p:cNvPr>
+          <p:cNvSpPr>
+            <a:spLocks noGrp="1"/>
+          </p:cNvSpPr>
+          <p:nvPr>
+            <p:ph idx="1"/>
+          </p:nvPr>
+        </p:nvSpPr>
+        <p:spPr/>
+        <p:txBody>
+          <a:bodyPr/>
+          <a:lstStyle/>
+          <a:p>
+            <a:r>
+              <a:rPr lang="en-GB" dirty="0"/>
+              <a:t>Start at the first item in the list. </a:t>
+            </a:r>
+          </a:p>
+          <a:p>
+            <a:r>
+              <a:rPr lang="en-GB" dirty="0"/>
+              <a:t>Compare the item with the search item</a:t>
+            </a:r>
+            <a:r>
+              <a:rPr lang="en-US" dirty="0"/>
+              <a:t>.</a:t>
+            </a:r>
+          </a:p>
+          <a:p>
+            <a:r>
+              <a:rPr lang="en-US" dirty="0"/>
+              <a:t>If they are the same, then stop.</a:t>
+            </a:r>
+          </a:p>
+          <a:p>
+            <a:r>
+              <a:rPr lang="en-US" dirty="0"/>
+              <a:t>If they are not, then move to the next item. </a:t>
+            </a:r>
+          </a:p>
+          <a:p>
+            <a:r>
+              <a:rPr lang="en-US" dirty="0"/>
+              <a:t>Repeat 2 to 4 until the end of the list is reached. </a:t>
+            </a:r>
+          </a:p>
+          <a:p>
+            <a:endParaRPr lang="en-GB" dirty="0"/>
+          </a:p>
+        </p:txBody>
+      </p:sp>
+    </p:spTree>
+    <p:extLst>
+      <p:ext uri="{BB962C8B-B14F-4D97-AF65-F5344CB8AC3E}">
+        <p14:creationId xmlns:p14="http://schemas.microsoft.com/office/powerpoint/2010/main" val="2640888221"/>
+      </p:ext>
+    </p:extLst>
+  </p:cSld>
+  <p:clrMapOvr>
+    <a:masterClrMapping/>
+  </p:clrMapOvr>
+</p:sld>
+</file>
+
+<file path=ppt/slides/slide19.xml><?xml version="1.0" encoding="utf-8"?>
+<p:sld xmlns:a="http://schemas.openxmlformats.org/drawingml/2006/main" xmlns:r="http://schemas.openxmlformats.org/officeDocument/2006/relationships" xmlns:p="http://schemas.openxmlformats.org/presentationml/2006/main">
+  <p:cSld>
+    <p:spTree>
+      <p:nvGrpSpPr>
+        <p:cNvPr id="1" name=""/>
+        <p:cNvGrpSpPr/>
+        <p:nvPr/>
+      </p:nvGrpSpPr>
+      <p:grpSpPr>
+        <a:xfrm>
+          <a:off x="0" y="0"/>
+          <a:ext cx="0" cy="0"/>
+          <a:chOff x="0" y="0"/>
+          <a:chExt cx="0" cy="0"/>
+        </a:xfrm>
+      </p:grpSpPr>
+      <p:sp>
+        <p:nvSpPr>
+          <p:cNvPr id="2" name="Title 1">
+            <a:extLst>
+              <a:ext uri="{FF2B5EF4-FFF2-40B4-BE49-F238E27FC236}">
+                <a16:creationId xmlns:a16="http://schemas.microsoft.com/office/drawing/2014/main" id="{A05DBBCE-290B-2752-6DCC-20E53BBD3D7A}"/>
+              </a:ext>
+            </a:extLst>
+          </p:cNvPr>
+          <p:cNvSpPr>
+            <a:spLocks noGrp="1"/>
+          </p:cNvSpPr>
+          <p:nvPr>
+            <p:ph type="title"/>
+          </p:nvPr>
+        </p:nvSpPr>
+        <p:spPr/>
+        <p:txBody>
+          <a:bodyPr/>
+          <a:lstStyle/>
+          <a:p>
+            <a:r>
+              <a:rPr lang="en-GB" dirty="0"/>
+              <a:t>Binary search</a:t>
+            </a:r>
+            <a:endParaRPr lang="en-US" dirty="0"/>
+          </a:p>
+        </p:txBody>
+      </p:sp>
+      <p:sp>
+        <p:nvSpPr>
+          <p:cNvPr id="3" name="Content Placeholder 2">
+            <a:extLst>
+              <a:ext uri="{FF2B5EF4-FFF2-40B4-BE49-F238E27FC236}">
+                <a16:creationId xmlns:a16="http://schemas.microsoft.com/office/drawing/2014/main" id="{BD73B89C-E0A8-F365-233A-8F94FF947C98}"/>
+              </a:ext>
+            </a:extLst>
+          </p:cNvPr>
+          <p:cNvSpPr>
+            <a:spLocks noGrp="1"/>
+          </p:cNvSpPr>
+          <p:nvPr>
+            <p:ph idx="1"/>
+          </p:nvPr>
+        </p:nvSpPr>
+        <p:spPr/>
+        <p:txBody>
+          <a:bodyPr/>
+          <a:lstStyle/>
+          <a:p>
+            <a:r>
+              <a:rPr lang="en-GB" dirty="0"/>
+              <a:t>Select the median item of the list. </a:t>
+            </a:r>
+          </a:p>
+          <a:p>
+            <a:r>
+              <a:rPr lang="en-GB" dirty="0"/>
+              <a:t>If the median is equal to the search item, then stop.</a:t>
+            </a:r>
+          </a:p>
+          <a:p>
+            <a:r>
+              <a:rPr lang="en-GB" dirty="0"/>
+              <a:t>If the media is too high, then repeat 1 and 2 with the sub-list to the left. </a:t>
+            </a:r>
+          </a:p>
+          <a:p>
+            <a:r>
+              <a:rPr lang="en-GB" dirty="0"/>
+              <a:t>If the median is too low, then repeat 1 and 2 with the sub-list to the right.</a:t>
+            </a:r>
+          </a:p>
+          <a:p>
+            <a:r>
+              <a:rPr lang="en-GB" dirty="0"/>
+              <a:t>Repeat steps 3 and 4 until the item has been found or all of the items have been checked.</a:t>
+            </a:r>
+          </a:p>
+          <a:p>
+            <a:r>
+              <a:rPr lang="en-GB" dirty="0"/>
+              <a:t>Binary search is much more efficient than the linear search.</a:t>
+            </a:r>
+            <a:endParaRPr lang="en-US" dirty="0"/>
+          </a:p>
+        </p:txBody>
+      </p:sp>
+    </p:spTree>
+    <p:extLst>
+      <p:ext uri="{BB962C8B-B14F-4D97-AF65-F5344CB8AC3E}">
+        <p14:creationId xmlns:p14="http://schemas.microsoft.com/office/powerpoint/2010/main" val="3966576346"/>
       </p:ext>
     </p:extLst>
   </p:cSld>
@@ -7845,6 +8318,170 @@
     <p:extLst>
       <p:ext uri="{BB962C8B-B14F-4D97-AF65-F5344CB8AC3E}">
         <p14:creationId xmlns:p14="http://schemas.microsoft.com/office/powerpoint/2010/main" val="3220235682"/>
+      </p:ext>
+    </p:extLst>
+  </p:cSld>
+  <p:clrMapOvr>
+    <a:masterClrMapping/>
+  </p:clrMapOvr>
+</p:sld>
+</file>
+
+<file path=ppt/slides/slide20.xml><?xml version="1.0" encoding="utf-8"?>
+<p:sld xmlns:a="http://schemas.openxmlformats.org/drawingml/2006/main" xmlns:r="http://schemas.openxmlformats.org/officeDocument/2006/relationships" xmlns:p="http://schemas.openxmlformats.org/presentationml/2006/main">
+  <p:cSld>
+    <p:spTree>
+      <p:nvGrpSpPr>
+        <p:cNvPr id="1" name=""/>
+        <p:cNvGrpSpPr/>
+        <p:nvPr/>
+      </p:nvGrpSpPr>
+      <p:grpSpPr>
+        <a:xfrm>
+          <a:off x="0" y="0"/>
+          <a:ext cx="0" cy="0"/>
+          <a:chOff x="0" y="0"/>
+          <a:chExt cx="0" cy="0"/>
+        </a:xfrm>
+      </p:grpSpPr>
+      <p:sp>
+        <p:nvSpPr>
+          <p:cNvPr id="2" name="Title 1">
+            <a:extLst>
+              <a:ext uri="{FF2B5EF4-FFF2-40B4-BE49-F238E27FC236}">
+                <a16:creationId xmlns:a16="http://schemas.microsoft.com/office/drawing/2014/main" id="{2EFC857A-4D4C-C433-9121-7A2757ADA2A3}"/>
+              </a:ext>
+            </a:extLst>
+          </p:cNvPr>
+          <p:cNvSpPr>
+            <a:spLocks noGrp="1"/>
+          </p:cNvSpPr>
+          <p:nvPr>
+            <p:ph type="title"/>
+          </p:nvPr>
+        </p:nvSpPr>
+        <p:spPr/>
+        <p:txBody>
+          <a:bodyPr/>
+          <a:lstStyle/>
+          <a:p>
+            <a:endParaRPr lang="en-US"/>
+          </a:p>
+        </p:txBody>
+      </p:sp>
+      <p:sp>
+        <p:nvSpPr>
+          <p:cNvPr id="3" name="Content Placeholder 2">
+            <a:extLst>
+              <a:ext uri="{FF2B5EF4-FFF2-40B4-BE49-F238E27FC236}">
+                <a16:creationId xmlns:a16="http://schemas.microsoft.com/office/drawing/2014/main" id="{6C4F8AEF-CBF4-ACEB-099D-EBD872042256}"/>
+              </a:ext>
+            </a:extLst>
+          </p:cNvPr>
+          <p:cNvSpPr>
+            <a:spLocks noGrp="1"/>
+          </p:cNvSpPr>
+          <p:nvPr>
+            <p:ph idx="1"/>
+          </p:nvPr>
+        </p:nvSpPr>
+        <p:spPr/>
+        <p:txBody>
+          <a:bodyPr/>
+          <a:lstStyle/>
+          <a:p>
+            <a:endParaRPr lang="en-US"/>
+          </a:p>
+        </p:txBody>
+      </p:sp>
+    </p:spTree>
+    <p:extLst>
+      <p:ext uri="{BB962C8B-B14F-4D97-AF65-F5344CB8AC3E}">
+        <p14:creationId xmlns:p14="http://schemas.microsoft.com/office/powerpoint/2010/main" val="2172048978"/>
+      </p:ext>
+    </p:extLst>
+  </p:cSld>
+  <p:clrMapOvr>
+    <a:masterClrMapping/>
+  </p:clrMapOvr>
+</p:sld>
+</file>
+
+<file path=ppt/slides/slide21.xml><?xml version="1.0" encoding="utf-8"?>
+<p:sld xmlns:a="http://schemas.openxmlformats.org/drawingml/2006/main" xmlns:r="http://schemas.openxmlformats.org/officeDocument/2006/relationships" xmlns:p="http://schemas.openxmlformats.org/presentationml/2006/main">
+  <p:cSld>
+    <p:spTree>
+      <p:nvGrpSpPr>
+        <p:cNvPr id="1" name=""/>
+        <p:cNvGrpSpPr/>
+        <p:nvPr/>
+      </p:nvGrpSpPr>
+      <p:grpSpPr>
+        <a:xfrm>
+          <a:off x="0" y="0"/>
+          <a:ext cx="0" cy="0"/>
+          <a:chOff x="0" y="0"/>
+          <a:chExt cx="0" cy="0"/>
+        </a:xfrm>
+      </p:grpSpPr>
+      <p:sp>
+        <p:nvSpPr>
+          <p:cNvPr id="2" name="Title 1">
+            <a:extLst>
+              <a:ext uri="{FF2B5EF4-FFF2-40B4-BE49-F238E27FC236}">
+                <a16:creationId xmlns:a16="http://schemas.microsoft.com/office/drawing/2014/main" id="{ABE24CAB-CCA1-B787-C9BA-406A1787AFC8}"/>
+              </a:ext>
+            </a:extLst>
+          </p:cNvPr>
+          <p:cNvSpPr>
+            <a:spLocks noGrp="1"/>
+          </p:cNvSpPr>
+          <p:nvPr>
+            <p:ph type="title"/>
+          </p:nvPr>
+        </p:nvSpPr>
+        <p:spPr/>
+        <p:txBody>
+          <a:bodyPr/>
+          <a:lstStyle/>
+          <a:p>
+            <a:r>
+              <a:rPr lang="en-GB" dirty="0"/>
+              <a:t>4. Decomposition and Abstraction</a:t>
+            </a:r>
+            <a:endParaRPr lang="en-US" dirty="0"/>
+          </a:p>
+        </p:txBody>
+      </p:sp>
+      <p:sp>
+        <p:nvSpPr>
+          <p:cNvPr id="3" name="Content Placeholder 2">
+            <a:extLst>
+              <a:ext uri="{FF2B5EF4-FFF2-40B4-BE49-F238E27FC236}">
+                <a16:creationId xmlns:a16="http://schemas.microsoft.com/office/drawing/2014/main" id="{D6746C6E-976E-54FD-34E7-B80DF60C0920}"/>
+              </a:ext>
+            </a:extLst>
+          </p:cNvPr>
+          <p:cNvSpPr>
+            <a:spLocks noGrp="1"/>
+          </p:cNvSpPr>
+          <p:nvPr>
+            <p:ph idx="1"/>
+          </p:nvPr>
+        </p:nvSpPr>
+        <p:spPr/>
+        <p:txBody>
+          <a:bodyPr/>
+          <a:lstStyle/>
+          <a:p>
+            <a:endParaRPr lang="en-US"/>
+          </a:p>
+        </p:txBody>
+      </p:sp>
+    </p:spTree>
+    <p:extLst>
+      <p:ext uri="{BB962C8B-B14F-4D97-AF65-F5344CB8AC3E}">
+        <p14:creationId xmlns:p14="http://schemas.microsoft.com/office/powerpoint/2010/main" val="1289465577"/>
       </p:ext>
     </p:extLst>
   </p:cSld>
@@ -9843,20 +10480,20 @@
 </file>
 
 <file path=customXml/item1.xml><?xml version="1.0" encoding="utf-8"?>
-<p:properties xmlns:p="http://schemas.microsoft.com/office/2006/metadata/properties" xmlns:xsi="http://www.w3.org/2001/XMLSchema-instance" xmlns:pc="http://schemas.microsoft.com/office/infopath/2007/PartnerControls">
-  <documentManagement>
-    <MediaServiceKeyPoints xmlns="14f5a3ae-0bb3-48a0-b93b-c008bd975cba" xsi:nil="true"/>
-  </documentManagement>
-</p:properties>
-</file>
-
-<file path=customXml/item2.xml><?xml version="1.0" encoding="utf-8"?>
 <?mso-contentType ?>
 <FormTemplates xmlns="http://schemas.microsoft.com/sharepoint/v3/contenttype/forms">
   <Display>DocumentLibraryForm</Display>
   <Edit>DocumentLibraryForm</Edit>
   <New>DocumentLibraryForm</New>
 </FormTemplates>
+</file>
+
+<file path=customXml/item2.xml><?xml version="1.0" encoding="utf-8"?>
+<p:properties xmlns:p="http://schemas.microsoft.com/office/2006/metadata/properties" xmlns:xsi="http://www.w3.org/2001/XMLSchema-instance" xmlns:pc="http://schemas.microsoft.com/office/infopath/2007/PartnerControls">
+  <documentManagement>
+    <MediaServiceKeyPoints xmlns="14f5a3ae-0bb3-48a0-b93b-c008bd975cba" xsi:nil="true"/>
+  </documentManagement>
+</p:properties>
 </file>
 
 <file path=customXml/item3.xml><?xml version="1.0" encoding="utf-8"?>
@@ -10006,6 +10643,14 @@
 </file>
 
 <file path=customXml/itemProps1.xml><?xml version="1.0" encoding="utf-8"?>
+<ds:datastoreItem xmlns:ds="http://schemas.openxmlformats.org/officeDocument/2006/customXml" ds:itemID="{64B270AB-C138-415C-897E-3C24487DECF1}">
+  <ds:schemaRefs>
+    <ds:schemaRef ds:uri="http://schemas.microsoft.com/sharepoint/v3/contenttype/forms"/>
+  </ds:schemaRefs>
+</ds:datastoreItem>
+</file>
+
+<file path=customXml/itemProps2.xml><?xml version="1.0" encoding="utf-8"?>
 <ds:datastoreItem xmlns:ds="http://schemas.openxmlformats.org/officeDocument/2006/customXml" ds:itemID="{2C4C00F4-06E9-43E3-AD97-88A857CEFA82}">
   <ds:schemaRefs>
     <ds:schemaRef ds:uri="http://schemas.openxmlformats.org/package/2006/metadata/core-properties"/>
@@ -10017,14 +10662,6 @@
     <ds:schemaRef ds:uri="http://schemas.microsoft.com/office/infopath/2007/PartnerControls"/>
     <ds:schemaRef ds:uri="14f5a3ae-0bb3-48a0-b93b-c008bd975cba"/>
     <ds:schemaRef ds:uri="http://schemas.microsoft.com/office/2006/metadata/properties"/>
-  </ds:schemaRefs>
-</ds:datastoreItem>
-</file>
-
-<file path=customXml/itemProps2.xml><?xml version="1.0" encoding="utf-8"?>
-<ds:datastoreItem xmlns:ds="http://schemas.openxmlformats.org/officeDocument/2006/customXml" ds:itemID="{64B270AB-C138-415C-897E-3C24487DECF1}">
-  <ds:schemaRefs>
-    <ds:schemaRef ds:uri="http://schemas.microsoft.com/sharepoint/v3/contenttype/forms"/>
   </ds:schemaRefs>
 </ds:datastoreItem>
 </file>

</xml_diff>

<commit_message>
Unit 1 Computer Science 9-1
Unit 1 Computer Science 9-1 Complete Presentation Slides.
</commit_message>
<xml_diff>
--- a/Computer Science GCSE(9-1) (2).pptx
+++ b/Computer Science GCSE(9-1) (2).pptx
@@ -5,7 +5,7 @@
     <p:sldMasterId id="2147483660" r:id="rId4"/>
   </p:sldMasterIdLst>
   <p:notesMasterIdLst>
-    <p:notesMasterId r:id="rId26"/>
+    <p:notesMasterId r:id="rId32"/>
   </p:notesMasterIdLst>
   <p:sldIdLst>
     <p:sldId id="278" r:id="rId5"/>
@@ -27,8 +27,14 @@
     <p:sldId id="294" r:id="rId21"/>
     <p:sldId id="295" r:id="rId22"/>
     <p:sldId id="296" r:id="rId23"/>
-    <p:sldId id="297" r:id="rId24"/>
-    <p:sldId id="298" r:id="rId25"/>
+    <p:sldId id="298" r:id="rId24"/>
+    <p:sldId id="299" r:id="rId25"/>
+    <p:sldId id="300" r:id="rId26"/>
+    <p:sldId id="301" r:id="rId27"/>
+    <p:sldId id="302" r:id="rId28"/>
+    <p:sldId id="303" r:id="rId29"/>
+    <p:sldId id="304" r:id="rId30"/>
+    <p:sldId id="305" r:id="rId31"/>
   </p:sldIdLst>
   <p:sldSz cx="12192000" cy="6858000"/>
   <p:notesSz cx="6858000" cy="9144000"/>
@@ -217,7 +223,7 @@
           <a:p>
             <a:fld id="{AFD01546-198A-4195-BCF8-F0FF54C90E5E}" type="datetimeFigureOut">
               <a:rPr lang="en-US" smtClean="0"/>
-              <a:t>7/2/2022</a:t>
+              <a:t>7/3/2022</a:t>
             </a:fld>
             <a:endParaRPr lang="en-US" dirty="0"/>
           </a:p>
@@ -813,7 +819,7 @@
           <a:p>
             <a:fld id="{88D38747-4367-4BD2-8D51-C97E202738E2}" type="datetime1">
               <a:rPr lang="en-US" smtClean="0"/>
-              <a:t>7/2/2022</a:t>
+              <a:t>7/3/2022</a:t>
             </a:fld>
             <a:endParaRPr lang="en-US" dirty="0"/>
           </a:p>
@@ -1118,7 +1124,7 @@
           <a:p>
             <a:fld id="{11F1B079-7EF0-44EE-B798-BCC497C9F3B2}" type="datetime1">
               <a:rPr lang="en-US" smtClean="0"/>
-              <a:t>7/2/2022</a:t>
+              <a:t>7/3/2022</a:t>
             </a:fld>
             <a:endParaRPr lang="en-US" dirty="0"/>
           </a:p>
@@ -1312,7 +1318,7 @@
           <a:p>
             <a:fld id="{28FF70A8-1D13-4657-95F0-A9EA54967B8D}" type="datetime1">
               <a:rPr lang="en-US" smtClean="0"/>
-              <a:t>7/2/2022</a:t>
+              <a:t>7/3/2022</a:t>
             </a:fld>
             <a:endParaRPr lang="en-US" dirty="0"/>
           </a:p>
@@ -1575,7 +1581,7 @@
           <a:p>
             <a:fld id="{21EB90AC-71BD-4C7F-8ACA-7B3F18292E63}" type="datetime1">
               <a:rPr lang="en-US" smtClean="0"/>
-              <a:t>7/2/2022</a:t>
+              <a:t>7/3/2022</a:t>
             </a:fld>
             <a:endParaRPr lang="en-US" dirty="0"/>
           </a:p>
@@ -2011,7 +2017,7 @@
           <a:p>
             <a:fld id="{4E6EFC2C-8905-46F0-B443-CE905B76BA01}" type="datetime1">
               <a:rPr lang="en-US" smtClean="0"/>
-              <a:t>7/2/2022</a:t>
+              <a:t>7/3/2022</a:t>
             </a:fld>
             <a:endParaRPr lang="en-US" dirty="0"/>
           </a:p>
@@ -2548,7 +2554,7 @@
           <a:p>
             <a:fld id="{D9079DC3-C9B5-499E-9140-0DC28B7074E2}" type="datetime1">
               <a:rPr lang="en-US" smtClean="0"/>
-              <a:t>7/2/2022</a:t>
+              <a:t>7/3/2022</a:t>
             </a:fld>
             <a:endParaRPr lang="en-US" dirty="0"/>
           </a:p>
@@ -3430,7 +3436,7 @@
           <a:p>
             <a:fld id="{30BB33EA-E472-4D22-9C03-A9C14AA21CED}" type="datetime1">
               <a:rPr lang="en-US" smtClean="0"/>
-              <a:t>7/2/2022</a:t>
+              <a:t>7/3/2022</a:t>
             </a:fld>
             <a:endParaRPr lang="en-US" dirty="0"/>
           </a:p>
@@ -3600,7 +3606,7 @@
           <a:p>
             <a:fld id="{73C55A3C-5767-4844-A0A3-83778C2E5409}" type="datetime1">
               <a:rPr lang="en-US" smtClean="0"/>
-              <a:t>7/2/2022</a:t>
+              <a:t>7/3/2022</a:t>
             </a:fld>
             <a:endParaRPr lang="en-US" dirty="0"/>
           </a:p>
@@ -3844,7 +3850,7 @@
           <a:p>
             <a:fld id="{CAE507A8-A5CF-4D38-AB86-7EDDA87A85D4}" type="datetime1">
               <a:rPr lang="en-US" smtClean="0"/>
-              <a:t>7/2/2022</a:t>
+              <a:t>7/3/2022</a:t>
             </a:fld>
             <a:endParaRPr lang="en-US" dirty="0"/>
           </a:p>
@@ -4086,7 +4092,7 @@
           <a:p>
             <a:fld id="{BDFCD27C-8599-43EF-BA1D-14DDC1946E06}" type="datetime1">
               <a:rPr lang="en-US" smtClean="0"/>
-              <a:t>7/2/2022</a:t>
+              <a:t>7/3/2022</a:t>
             </a:fld>
             <a:endParaRPr lang="en-US" dirty="0"/>
           </a:p>
@@ -4569,7 +4575,7 @@
           <a:p>
             <a:fld id="{49343D99-809A-49C0-96E5-4250D0B498EE}" type="datetime1">
               <a:rPr lang="en-US" smtClean="0"/>
-              <a:t>7/2/2022</a:t>
+              <a:t>7/3/2022</a:t>
             </a:fld>
             <a:endParaRPr lang="en-US" dirty="0"/>
           </a:p>
@@ -4687,7 +4693,7 @@
           <a:p>
             <a:fld id="{A143DE9B-B678-4EFB-BB7D-A4370204A0B0}" type="datetime1">
               <a:rPr lang="en-US" smtClean="0"/>
-              <a:t>7/2/2022</a:t>
+              <a:t>7/3/2022</a:t>
             </a:fld>
             <a:endParaRPr lang="en-US" dirty="0"/>
           </a:p>
@@ -4782,7 +4788,7 @@
           <a:p>
             <a:fld id="{E68812DA-F765-4142-A6A3-A8ED7235E082}" type="datetime1">
               <a:rPr lang="en-US" smtClean="0"/>
-              <a:t>7/2/2022</a:t>
+              <a:t>7/3/2022</a:t>
             </a:fld>
             <a:endParaRPr lang="en-US" dirty="0"/>
           </a:p>
@@ -5037,7 +5043,7 @@
           <a:p>
             <a:fld id="{3E0277FD-7DE6-41D4-930D-AC99F5AFE54E}" type="datetime1">
               <a:rPr lang="en-US" smtClean="0"/>
-              <a:t>7/2/2022</a:t>
+              <a:t>7/3/2022</a:t>
             </a:fld>
             <a:endParaRPr lang="en-US" dirty="0"/>
           </a:p>
@@ -5344,7 +5350,7 @@
           <a:p>
             <a:fld id="{9EA15526-7079-4B7B-987C-1B5FAE11A0FF}" type="datetime1">
               <a:rPr lang="en-US" smtClean="0"/>
-              <a:t>7/2/2022</a:t>
+              <a:t>7/3/2022</a:t>
             </a:fld>
             <a:endParaRPr lang="en-US" dirty="0"/>
           </a:p>
@@ -5579,7 +5585,7 @@
           <a:p>
             <a:fld id="{073ED0CC-082F-4160-86E5-0D6041F12778}" type="datetime1">
               <a:rPr lang="en-US" smtClean="0"/>
-              <a:t>7/2/2022</a:t>
+              <a:t>7/3/2022</a:t>
             </a:fld>
             <a:endParaRPr lang="en-US" dirty="0"/>
           </a:p>
@@ -6497,7 +6503,7 @@
           </a:effectLst>
           <a:extLst>
             <a:ext uri="{91240B29-F687-4f45-9708-019B960494DF}">
-              <a14:hiddenLine xmlns:a16="http://schemas.microsoft.com/office/drawing/2014/main" xmlns:p14="http://schemas.microsoft.com/office/powerpoint/2010/main" xmlns:a14="http://schemas.microsoft.com/office/drawing/2010/main" xmlns="" w="9525">
+              <a14:hiddenLine xmlns="" xmlns:a14="http://schemas.microsoft.com/office/drawing/2010/main" xmlns:p14="http://schemas.microsoft.com/office/powerpoint/2010/main" xmlns:a16="http://schemas.microsoft.com/office/drawing/2014/main" w="9525">
                 <a:solidFill>
                   <a:srgbClr val="000000"/>
                 </a:solidFill>
@@ -8349,7 +8355,7 @@
           <p:cNvPr id="2" name="Title 1">
             <a:extLst>
               <a:ext uri="{FF2B5EF4-FFF2-40B4-BE49-F238E27FC236}">
-                <a16:creationId xmlns:a16="http://schemas.microsoft.com/office/drawing/2014/main" id="{2EFC857A-4D4C-C433-9121-7A2757ADA2A3}"/>
+                <a16:creationId xmlns:a16="http://schemas.microsoft.com/office/drawing/2014/main" id="{ABE24CAB-CCA1-B787-C9BA-406A1787AFC8}"/>
               </a:ext>
             </a:extLst>
           </p:cNvPr>
@@ -8365,7 +8371,11 @@
           <a:bodyPr/>
           <a:lstStyle/>
           <a:p>
-            <a:endParaRPr lang="en-US"/>
+            <a:r>
+              <a:rPr lang="en-GB" dirty="0"/>
+              <a:t>4. Decomposition and Abstraction</a:t>
+            </a:r>
+            <a:endParaRPr lang="en-US" dirty="0"/>
           </a:p>
         </p:txBody>
       </p:sp>
@@ -8374,7 +8384,7 @@
           <p:cNvPr id="3" name="Content Placeholder 2">
             <a:extLst>
               <a:ext uri="{FF2B5EF4-FFF2-40B4-BE49-F238E27FC236}">
-                <a16:creationId xmlns:a16="http://schemas.microsoft.com/office/drawing/2014/main" id="{6C4F8AEF-CBF4-ACEB-099D-EBD872042256}"/>
+                <a16:creationId xmlns:a16="http://schemas.microsoft.com/office/drawing/2014/main" id="{D6746C6E-976E-54FD-34E7-B80DF60C0920}"/>
               </a:ext>
             </a:extLst>
           </p:cNvPr>
@@ -8390,14 +8400,35 @@
           <a:bodyPr/>
           <a:lstStyle/>
           <a:p>
-            <a:endParaRPr lang="en-US"/>
+            <a:r>
+              <a:rPr lang="en-US" dirty="0"/>
+              <a:t>Analyze a program, investigate requirements (inputs, outputs, processing, initialization) and design solutions.</a:t>
+            </a:r>
+          </a:p>
+          <a:p>
+            <a:r>
+              <a:rPr lang="en-US" dirty="0"/>
+              <a:t>Decompose a problem into smaller sub-problems</a:t>
+            </a:r>
+          </a:p>
+          <a:p>
+            <a:r>
+              <a:rPr lang="en-US" dirty="0"/>
+              <a:t>Understand how abstraction can be used effectively to model aspects of the real world</a:t>
+            </a:r>
+          </a:p>
+          <a:p>
+            <a:r>
+              <a:rPr lang="en-US" dirty="0"/>
+              <a:t>Program abstractions of real-world example.</a:t>
+            </a:r>
           </a:p>
         </p:txBody>
       </p:sp>
     </p:spTree>
     <p:extLst>
       <p:ext uri="{BB962C8B-B14F-4D97-AF65-F5344CB8AC3E}">
-        <p14:creationId xmlns:p14="http://schemas.microsoft.com/office/powerpoint/2010/main" val="2172048978"/>
+        <p14:creationId xmlns:p14="http://schemas.microsoft.com/office/powerpoint/2010/main" val="1289465577"/>
       </p:ext>
     </p:extLst>
   </p:cSld>
@@ -8429,7 +8460,7 @@
           <p:cNvPr id="2" name="Title 1">
             <a:extLst>
               <a:ext uri="{FF2B5EF4-FFF2-40B4-BE49-F238E27FC236}">
-                <a16:creationId xmlns:a16="http://schemas.microsoft.com/office/drawing/2014/main" id="{ABE24CAB-CCA1-B787-C9BA-406A1787AFC8}"/>
+                <a16:creationId xmlns:a16="http://schemas.microsoft.com/office/drawing/2014/main" id="{47206057-0DF4-EC98-9095-B0BDA66BC9B7}"/>
               </a:ext>
             </a:extLst>
           </p:cNvPr>
@@ -8442,14 +8473,15 @@
         </p:nvSpPr>
         <p:spPr/>
         <p:txBody>
-          <a:bodyPr/>
-          <a:lstStyle/>
-          <a:p>
-            <a:r>
-              <a:rPr lang="en-GB" dirty="0"/>
-              <a:t>4. Decomposition and Abstraction</a:t>
-            </a:r>
-            <a:endParaRPr lang="en-US" dirty="0"/>
+          <a:bodyPr>
+            <a:normAutofit fontScale="90000"/>
+          </a:bodyPr>
+          <a:lstStyle/>
+          <a:p>
+            <a:r>
+              <a:rPr lang="en-US" dirty="0"/>
+              <a:t>Definition of decomposition and abstraction</a:t>
+            </a:r>
           </a:p>
         </p:txBody>
       </p:sp>
@@ -8458,7 +8490,7 @@
           <p:cNvPr id="3" name="Content Placeholder 2">
             <a:extLst>
               <a:ext uri="{FF2B5EF4-FFF2-40B4-BE49-F238E27FC236}">
-                <a16:creationId xmlns:a16="http://schemas.microsoft.com/office/drawing/2014/main" id="{D6746C6E-976E-54FD-34E7-B80DF60C0920}"/>
+                <a16:creationId xmlns:a16="http://schemas.microsoft.com/office/drawing/2014/main" id="{C85D220D-0F07-FF33-02B8-ABBD784994A6}"/>
               </a:ext>
             </a:extLst>
           </p:cNvPr>
@@ -8474,14 +8506,706 @@
           <a:bodyPr/>
           <a:lstStyle/>
           <a:p>
-            <a:endParaRPr lang="en-US"/>
+            <a:r>
+              <a:rPr lang="en-US" dirty="0"/>
+              <a:t>Decomposition is when breaking a problem down inro smaller, more manageable parts, which are then easier to solve. </a:t>
+            </a:r>
+          </a:p>
+          <a:p>
+            <a:r>
+              <a:rPr lang="en-US" dirty="0"/>
+              <a:t>Abstraction is when the process of removing or hiding necessary detail so that only the important points remain</a:t>
+            </a:r>
+          </a:p>
+          <a:p>
+            <a:endParaRPr lang="en-US" dirty="0"/>
           </a:p>
         </p:txBody>
       </p:sp>
     </p:spTree>
     <p:extLst>
       <p:ext uri="{BB962C8B-B14F-4D97-AF65-F5344CB8AC3E}">
-        <p14:creationId xmlns:p14="http://schemas.microsoft.com/office/powerpoint/2010/main" val="1289465577"/>
+        <p14:creationId xmlns:p14="http://schemas.microsoft.com/office/powerpoint/2010/main" val="724307606"/>
+      </p:ext>
+    </p:extLst>
+  </p:cSld>
+  <p:clrMapOvr>
+    <a:masterClrMapping/>
+  </p:clrMapOvr>
+</p:sld>
+</file>
+
+<file path=ppt/slides/slide22.xml><?xml version="1.0" encoding="utf-8"?>
+<p:sld xmlns:a="http://schemas.openxmlformats.org/drawingml/2006/main" xmlns:r="http://schemas.openxmlformats.org/officeDocument/2006/relationships" xmlns:p="http://schemas.openxmlformats.org/presentationml/2006/main">
+  <p:cSld>
+    <p:spTree>
+      <p:nvGrpSpPr>
+        <p:cNvPr id="1" name=""/>
+        <p:cNvGrpSpPr/>
+        <p:nvPr/>
+      </p:nvGrpSpPr>
+      <p:grpSpPr>
+        <a:xfrm>
+          <a:off x="0" y="0"/>
+          <a:ext cx="0" cy="0"/>
+          <a:chOff x="0" y="0"/>
+          <a:chExt cx="0" cy="0"/>
+        </a:xfrm>
+      </p:grpSpPr>
+      <p:sp>
+        <p:nvSpPr>
+          <p:cNvPr id="2" name="Title 1">
+            <a:extLst>
+              <a:ext uri="{FF2B5EF4-FFF2-40B4-BE49-F238E27FC236}">
+                <a16:creationId xmlns:a16="http://schemas.microsoft.com/office/drawing/2014/main" id="{140BDC7D-5544-84C8-A0C2-E51D052ECAAA}"/>
+              </a:ext>
+            </a:extLst>
+          </p:cNvPr>
+          <p:cNvSpPr>
+            <a:spLocks noGrp="1"/>
+          </p:cNvSpPr>
+          <p:nvPr>
+            <p:ph type="title"/>
+          </p:nvPr>
+        </p:nvSpPr>
+        <p:spPr/>
+        <p:txBody>
+          <a:bodyPr>
+            <a:normAutofit fontScale="90000"/>
+          </a:bodyPr>
+          <a:lstStyle/>
+          <a:p>
+            <a:r>
+              <a:rPr lang="en-US" dirty="0"/>
+              <a:t>Design and create </a:t>
+            </a:r>
+            <a:r>
+              <a:rPr lang="en-US" dirty="0" err="1"/>
+              <a:t>noughts</a:t>
+            </a:r>
+            <a:r>
+              <a:rPr lang="en-US" dirty="0"/>
+              <a:t> and crosses game</a:t>
+            </a:r>
+          </a:p>
+        </p:txBody>
+      </p:sp>
+      <p:sp>
+        <p:nvSpPr>
+          <p:cNvPr id="3" name="Content Placeholder 2">
+            <a:extLst>
+              <a:ext uri="{FF2B5EF4-FFF2-40B4-BE49-F238E27FC236}">
+                <a16:creationId xmlns:a16="http://schemas.microsoft.com/office/drawing/2014/main" id="{C047A323-6D98-587E-3097-0BE13BAE0ED1}"/>
+              </a:ext>
+            </a:extLst>
+          </p:cNvPr>
+          <p:cNvSpPr>
+            <a:spLocks noGrp="1"/>
+          </p:cNvSpPr>
+          <p:nvPr>
+            <p:ph idx="1"/>
+          </p:nvPr>
+        </p:nvSpPr>
+        <p:spPr/>
+        <p:txBody>
+          <a:bodyPr>
+            <a:normAutofit lnSpcReduction="10000"/>
+          </a:bodyPr>
+          <a:lstStyle/>
+          <a:p>
+            <a:r>
+              <a:rPr lang="en-US" dirty="0"/>
+              <a:t>The goal in designing algorithms is the fact that we shall solve sub-programs. In order to do that we first need to clarify the sub-programs. </a:t>
+            </a:r>
+          </a:p>
+          <a:p>
+            <a:r>
+              <a:rPr lang="en-US" dirty="0"/>
+              <a:t>In this game, the first step is to design an interface showing the 3 x 3 grid. </a:t>
+            </a:r>
+          </a:p>
+          <a:p>
+            <a:r>
+              <a:rPr lang="en-US" dirty="0"/>
+              <a:t>The second step, is to keep track of which squares have been selected by X and 0 and which are free. </a:t>
+            </a:r>
+          </a:p>
+          <a:p>
+            <a:r>
+              <a:rPr lang="en-US" dirty="0"/>
+              <a:t>The third step is how the computer will decide which square to select. </a:t>
+            </a:r>
+          </a:p>
+          <a:p>
+            <a:r>
+              <a:rPr lang="en-US" dirty="0"/>
+              <a:t>The last one is how the computer will decide when the game is over and who has won. </a:t>
+            </a:r>
+          </a:p>
+        </p:txBody>
+      </p:sp>
+    </p:spTree>
+    <p:extLst>
+      <p:ext uri="{BB962C8B-B14F-4D97-AF65-F5344CB8AC3E}">
+        <p14:creationId xmlns:p14="http://schemas.microsoft.com/office/powerpoint/2010/main" val="2105899266"/>
+      </p:ext>
+    </p:extLst>
+  </p:cSld>
+  <p:clrMapOvr>
+    <a:masterClrMapping/>
+  </p:clrMapOvr>
+</p:sld>
+</file>
+
+<file path=ppt/slides/slide23.xml><?xml version="1.0" encoding="utf-8"?>
+<p:sld xmlns:a="http://schemas.openxmlformats.org/drawingml/2006/main" xmlns:r="http://schemas.openxmlformats.org/officeDocument/2006/relationships" xmlns:p="http://schemas.openxmlformats.org/presentationml/2006/main">
+  <p:cSld>
+    <p:spTree>
+      <p:nvGrpSpPr>
+        <p:cNvPr id="1" name=""/>
+        <p:cNvGrpSpPr/>
+        <p:nvPr/>
+      </p:nvGrpSpPr>
+      <p:grpSpPr>
+        <a:xfrm>
+          <a:off x="0" y="0"/>
+          <a:ext cx="0" cy="0"/>
+          <a:chOff x="0" y="0"/>
+          <a:chExt cx="0" cy="0"/>
+        </a:xfrm>
+      </p:grpSpPr>
+      <p:sp>
+        <p:nvSpPr>
+          <p:cNvPr id="2" name="Title 1">
+            <a:extLst>
+              <a:ext uri="{FF2B5EF4-FFF2-40B4-BE49-F238E27FC236}">
+                <a16:creationId xmlns:a16="http://schemas.microsoft.com/office/drawing/2014/main" id="{1363D78F-CF8C-E09D-9927-94BF8FA1C29E}"/>
+              </a:ext>
+            </a:extLst>
+          </p:cNvPr>
+          <p:cNvSpPr>
+            <a:spLocks noGrp="1"/>
+          </p:cNvSpPr>
+          <p:nvPr>
+            <p:ph type="title"/>
+          </p:nvPr>
+        </p:nvSpPr>
+        <p:spPr/>
+        <p:txBody>
+          <a:bodyPr/>
+          <a:lstStyle/>
+          <a:p>
+            <a:r>
+              <a:rPr lang="en-US" dirty="0"/>
+              <a:t>Levels of abstraction</a:t>
+            </a:r>
+          </a:p>
+        </p:txBody>
+      </p:sp>
+      <p:sp>
+        <p:nvSpPr>
+          <p:cNvPr id="3" name="Content Placeholder 2">
+            <a:extLst>
+              <a:ext uri="{FF2B5EF4-FFF2-40B4-BE49-F238E27FC236}">
+                <a16:creationId xmlns:a16="http://schemas.microsoft.com/office/drawing/2014/main" id="{E38896EA-4DD2-8CDB-3884-24AB8555E860}"/>
+              </a:ext>
+            </a:extLst>
+          </p:cNvPr>
+          <p:cNvSpPr>
+            <a:spLocks noGrp="1"/>
+          </p:cNvSpPr>
+          <p:nvPr>
+            <p:ph idx="1"/>
+          </p:nvPr>
+        </p:nvSpPr>
+        <p:spPr/>
+        <p:txBody>
+          <a:bodyPr>
+            <a:normAutofit lnSpcReduction="10000"/>
+          </a:bodyPr>
+          <a:lstStyle/>
+          <a:p>
+            <a:r>
+              <a:rPr lang="en-US" dirty="0"/>
+              <a:t>There are different levels or types of abstraction. The higher the level of abstraction, the less detail is required. We use abstraction all the time in accomplishing everyday tasks. </a:t>
+            </a:r>
+          </a:p>
+          <a:p>
+            <a:r>
+              <a:rPr lang="en-US" dirty="0"/>
+              <a:t>When programmers write the print command, they do not have to bother about all of the details of how this will be accomplished. They are removed from them. They are at a certain level of abstraction. </a:t>
+            </a:r>
+          </a:p>
+          <a:p>
+            <a:r>
+              <a:rPr lang="en-US" dirty="0"/>
+              <a:t>A driver turning the ignition key to start a car does not have to understand how the engine works or  how the spark to ignite the petrol is generated. It just happens and they can simply drive the car. That is abstraction in less detail. </a:t>
+            </a:r>
+          </a:p>
+        </p:txBody>
+      </p:sp>
+    </p:spTree>
+    <p:extLst>
+      <p:ext uri="{BB962C8B-B14F-4D97-AF65-F5344CB8AC3E}">
+        <p14:creationId xmlns:p14="http://schemas.microsoft.com/office/powerpoint/2010/main" val="2833889053"/>
+      </p:ext>
+    </p:extLst>
+  </p:cSld>
+  <p:clrMapOvr>
+    <a:masterClrMapping/>
+  </p:clrMapOvr>
+</p:sld>
+</file>
+
+<file path=ppt/slides/slide24.xml><?xml version="1.0" encoding="utf-8"?>
+<p:sld xmlns:a="http://schemas.openxmlformats.org/drawingml/2006/main" xmlns:r="http://schemas.openxmlformats.org/officeDocument/2006/relationships" xmlns:p="http://schemas.openxmlformats.org/presentationml/2006/main">
+  <p:cSld>
+    <p:spTree>
+      <p:nvGrpSpPr>
+        <p:cNvPr id="1" name=""/>
+        <p:cNvGrpSpPr/>
+        <p:nvPr/>
+      </p:nvGrpSpPr>
+      <p:grpSpPr>
+        <a:xfrm>
+          <a:off x="0" y="0"/>
+          <a:ext cx="0" cy="0"/>
+          <a:chOff x="0" y="0"/>
+          <a:chExt cx="0" cy="0"/>
+        </a:xfrm>
+      </p:grpSpPr>
+      <p:sp>
+        <p:nvSpPr>
+          <p:cNvPr id="2" name="Title 1">
+            <a:extLst>
+              <a:ext uri="{FF2B5EF4-FFF2-40B4-BE49-F238E27FC236}">
+                <a16:creationId xmlns:a16="http://schemas.microsoft.com/office/drawing/2014/main" id="{E64FD6E1-5EEB-4C20-51EF-962A64DE68AA}"/>
+              </a:ext>
+            </a:extLst>
+          </p:cNvPr>
+          <p:cNvSpPr>
+            <a:spLocks noGrp="1"/>
+          </p:cNvSpPr>
+          <p:nvPr>
+            <p:ph type="title"/>
+          </p:nvPr>
+        </p:nvSpPr>
+        <p:spPr/>
+        <p:txBody>
+          <a:bodyPr/>
+          <a:lstStyle/>
+          <a:p>
+            <a:r>
+              <a:rPr lang="en-US" dirty="0" err="1"/>
+              <a:t>Noughts</a:t>
+            </a:r>
+            <a:r>
+              <a:rPr lang="en-US" dirty="0"/>
+              <a:t> and crosses game abstraction</a:t>
+            </a:r>
+          </a:p>
+        </p:txBody>
+      </p:sp>
+      <p:sp>
+        <p:nvSpPr>
+          <p:cNvPr id="3" name="Content Placeholder 2">
+            <a:extLst>
+              <a:ext uri="{FF2B5EF4-FFF2-40B4-BE49-F238E27FC236}">
+                <a16:creationId xmlns:a16="http://schemas.microsoft.com/office/drawing/2014/main" id="{8AB43BC7-B74E-A3EF-C810-CCABF125B2FF}"/>
+              </a:ext>
+            </a:extLst>
+          </p:cNvPr>
+          <p:cNvSpPr>
+            <a:spLocks noGrp="1"/>
+          </p:cNvSpPr>
+          <p:nvPr>
+            <p:ph idx="1"/>
+          </p:nvPr>
+        </p:nvSpPr>
+        <p:spPr/>
+        <p:txBody>
+          <a:bodyPr/>
+          <a:lstStyle/>
+          <a:p>
+            <a:r>
+              <a:rPr lang="en-US" dirty="0"/>
+              <a:t>The computer goes first. Then the user. This continues until either one wins, or all of the squares have been used. It shall generated through inputs and outputs. </a:t>
+            </a:r>
+          </a:p>
+          <a:p>
+            <a:r>
+              <a:rPr lang="en-US" dirty="0"/>
+              <a:t>Start the game. </a:t>
+            </a:r>
+          </a:p>
+          <a:p>
+            <a:r>
+              <a:rPr lang="en-US" dirty="0"/>
+              <a:t>Entries for the user. </a:t>
+            </a:r>
+          </a:p>
+          <a:p>
+            <a:r>
+              <a:rPr lang="en-US" dirty="0"/>
+              <a:t>Select a new game or finish. </a:t>
+            </a:r>
+          </a:p>
+          <a:p>
+            <a:r>
+              <a:rPr lang="en-US" dirty="0"/>
+              <a:t>A message to inform the user when it is their turn. </a:t>
+            </a:r>
+          </a:p>
+          <a:p>
+            <a:r>
+              <a:rPr lang="en-US" dirty="0"/>
+              <a:t>A message to inform the user if they try to select a square that has already been used. </a:t>
+            </a:r>
+          </a:p>
+        </p:txBody>
+      </p:sp>
+    </p:spTree>
+    <p:extLst>
+      <p:ext uri="{BB962C8B-B14F-4D97-AF65-F5344CB8AC3E}">
+        <p14:creationId xmlns:p14="http://schemas.microsoft.com/office/powerpoint/2010/main" val="3969397588"/>
+      </p:ext>
+    </p:extLst>
+  </p:cSld>
+  <p:clrMapOvr>
+    <a:masterClrMapping/>
+  </p:clrMapOvr>
+</p:sld>
+</file>
+
+<file path=ppt/slides/slide25.xml><?xml version="1.0" encoding="utf-8"?>
+<p:sld xmlns:a="http://schemas.openxmlformats.org/drawingml/2006/main" xmlns:r="http://schemas.openxmlformats.org/officeDocument/2006/relationships" xmlns:p="http://schemas.openxmlformats.org/presentationml/2006/main">
+  <p:cSld>
+    <p:spTree>
+      <p:nvGrpSpPr>
+        <p:cNvPr id="1" name=""/>
+        <p:cNvGrpSpPr/>
+        <p:nvPr/>
+      </p:nvGrpSpPr>
+      <p:grpSpPr>
+        <a:xfrm>
+          <a:off x="0" y="0"/>
+          <a:ext cx="0" cy="0"/>
+          <a:chOff x="0" y="0"/>
+          <a:chExt cx="0" cy="0"/>
+        </a:xfrm>
+      </p:grpSpPr>
+      <p:sp>
+        <p:nvSpPr>
+          <p:cNvPr id="2" name="Title 1">
+            <a:extLst>
+              <a:ext uri="{FF2B5EF4-FFF2-40B4-BE49-F238E27FC236}">
+                <a16:creationId xmlns:a16="http://schemas.microsoft.com/office/drawing/2014/main" id="{3F26D9D6-1B7D-09F6-B959-811096E43E21}"/>
+              </a:ext>
+            </a:extLst>
+          </p:cNvPr>
+          <p:cNvSpPr>
+            <a:spLocks noGrp="1"/>
+          </p:cNvSpPr>
+          <p:nvPr>
+            <p:ph type="title"/>
+          </p:nvPr>
+        </p:nvSpPr>
+        <p:spPr/>
+        <p:txBody>
+          <a:bodyPr/>
+          <a:lstStyle/>
+          <a:p>
+            <a:r>
+              <a:rPr lang="en-US" dirty="0"/>
+              <a:t>…and more on </a:t>
+            </a:r>
+            <a:r>
+              <a:rPr lang="en-US" dirty="0" err="1"/>
+              <a:t>noughts</a:t>
+            </a:r>
+            <a:r>
+              <a:rPr lang="en-US" dirty="0"/>
+              <a:t> and crosses Part I</a:t>
+            </a:r>
+          </a:p>
+        </p:txBody>
+      </p:sp>
+      <p:sp>
+        <p:nvSpPr>
+          <p:cNvPr id="3" name="Content Placeholder 2">
+            <a:extLst>
+              <a:ext uri="{FF2B5EF4-FFF2-40B4-BE49-F238E27FC236}">
+                <a16:creationId xmlns:a16="http://schemas.microsoft.com/office/drawing/2014/main" id="{D349446A-72F8-5BD5-7AC8-59152BF238EF}"/>
+              </a:ext>
+            </a:extLst>
+          </p:cNvPr>
+          <p:cNvSpPr>
+            <a:spLocks noGrp="1"/>
+          </p:cNvSpPr>
+          <p:nvPr>
+            <p:ph idx="1"/>
+          </p:nvPr>
+        </p:nvSpPr>
+        <p:spPr/>
+        <p:txBody>
+          <a:bodyPr/>
+          <a:lstStyle/>
+          <a:p>
+            <a:r>
+              <a:rPr lang="en-US" dirty="0"/>
+              <a:t>A message to inform the user if the game is a draw. </a:t>
+            </a:r>
+          </a:p>
+          <a:p>
+            <a:r>
+              <a:rPr lang="en-US" dirty="0"/>
+              <a:t>A message to inform the user if they or the computer has won. </a:t>
+            </a:r>
+          </a:p>
+          <a:p>
+            <a:r>
+              <a:rPr lang="en-US" dirty="0"/>
+              <a:t>A message to ask the user if they want to play another game or want to finish </a:t>
+            </a:r>
+          </a:p>
+          <a:p>
+            <a:r>
+              <a:rPr lang="en-US" dirty="0"/>
+              <a:t>Therefore, we move on to processing and initialization</a:t>
+            </a:r>
+          </a:p>
+          <a:p>
+            <a:r>
+              <a:rPr lang="en-US" dirty="0"/>
+              <a:t>Set up the grid with nine squares. </a:t>
+            </a:r>
+          </a:p>
+          <a:p>
+            <a:r>
+              <a:rPr lang="en-US" dirty="0" err="1"/>
+              <a:t>Initialise</a:t>
+            </a:r>
+            <a:r>
+              <a:rPr lang="en-US" dirty="0"/>
+              <a:t> all variables to a start value. </a:t>
+            </a:r>
+          </a:p>
+          <a:p>
+            <a:r>
+              <a:rPr lang="en-US" dirty="0"/>
+              <a:t>Decide which square the computer will select. </a:t>
+            </a:r>
+          </a:p>
+        </p:txBody>
+      </p:sp>
+    </p:spTree>
+    <p:extLst>
+      <p:ext uri="{BB962C8B-B14F-4D97-AF65-F5344CB8AC3E}">
+        <p14:creationId xmlns:p14="http://schemas.microsoft.com/office/powerpoint/2010/main" val="2383947681"/>
+      </p:ext>
+    </p:extLst>
+  </p:cSld>
+  <p:clrMapOvr>
+    <a:masterClrMapping/>
+  </p:clrMapOvr>
+</p:sld>
+</file>
+
+<file path=ppt/slides/slide26.xml><?xml version="1.0" encoding="utf-8"?>
+<p:sld xmlns:a="http://schemas.openxmlformats.org/drawingml/2006/main" xmlns:r="http://schemas.openxmlformats.org/officeDocument/2006/relationships" xmlns:p="http://schemas.openxmlformats.org/presentationml/2006/main">
+  <p:cSld>
+    <p:spTree>
+      <p:nvGrpSpPr>
+        <p:cNvPr id="1" name=""/>
+        <p:cNvGrpSpPr/>
+        <p:nvPr/>
+      </p:nvGrpSpPr>
+      <p:grpSpPr>
+        <a:xfrm>
+          <a:off x="0" y="0"/>
+          <a:ext cx="0" cy="0"/>
+          <a:chOff x="0" y="0"/>
+          <a:chExt cx="0" cy="0"/>
+        </a:xfrm>
+      </p:grpSpPr>
+      <p:sp>
+        <p:nvSpPr>
+          <p:cNvPr id="2" name="Title 1">
+            <a:extLst>
+              <a:ext uri="{FF2B5EF4-FFF2-40B4-BE49-F238E27FC236}">
+                <a16:creationId xmlns:a16="http://schemas.microsoft.com/office/drawing/2014/main" id="{8E616DEB-BD12-8CC1-016B-A2D206438E7D}"/>
+              </a:ext>
+            </a:extLst>
+          </p:cNvPr>
+          <p:cNvSpPr>
+            <a:spLocks noGrp="1"/>
+          </p:cNvSpPr>
+          <p:nvPr>
+            <p:ph type="title"/>
+          </p:nvPr>
+        </p:nvSpPr>
+        <p:spPr/>
+        <p:txBody>
+          <a:bodyPr/>
+          <a:lstStyle/>
+          <a:p>
+            <a:r>
+              <a:rPr lang="en-US" dirty="0"/>
+              <a:t>…and more </a:t>
+            </a:r>
+            <a:r>
+              <a:rPr lang="en-US" dirty="0" err="1"/>
+              <a:t>noughts</a:t>
+            </a:r>
+            <a:r>
+              <a:rPr lang="en-US" dirty="0"/>
+              <a:t> and crosses Part II</a:t>
+            </a:r>
+          </a:p>
+        </p:txBody>
+      </p:sp>
+      <p:sp>
+        <p:nvSpPr>
+          <p:cNvPr id="3" name="Content Placeholder 2">
+            <a:extLst>
+              <a:ext uri="{FF2B5EF4-FFF2-40B4-BE49-F238E27FC236}">
+                <a16:creationId xmlns:a16="http://schemas.microsoft.com/office/drawing/2014/main" id="{48BE0819-5796-1B0E-3842-31C94603A072}"/>
+              </a:ext>
+            </a:extLst>
+          </p:cNvPr>
+          <p:cNvSpPr>
+            <a:spLocks noGrp="1"/>
+          </p:cNvSpPr>
+          <p:nvPr>
+            <p:ph idx="1"/>
+          </p:nvPr>
+        </p:nvSpPr>
+        <p:spPr/>
+        <p:txBody>
+          <a:bodyPr/>
+          <a:lstStyle/>
+          <a:p>
+            <a:r>
+              <a:rPr lang="en-US" dirty="0"/>
+              <a:t>Allow the user to select a square. </a:t>
+            </a:r>
+          </a:p>
+          <a:p>
+            <a:r>
+              <a:rPr lang="en-US" dirty="0"/>
+              <a:t>Check if the user has selected an already used square. </a:t>
+            </a:r>
+          </a:p>
+          <a:p>
+            <a:r>
+              <a:rPr lang="en-US" dirty="0"/>
+              <a:t>Check if the computer or the user has won. </a:t>
+            </a:r>
+          </a:p>
+          <a:p>
+            <a:r>
+              <a:rPr lang="en-US" dirty="0"/>
+              <a:t>Check if all squares have been used and the game is a draw. </a:t>
+            </a:r>
+          </a:p>
+          <a:p>
+            <a:r>
+              <a:rPr lang="en-US" dirty="0"/>
+              <a:t>Allow the user to select a new game or finish. </a:t>
+            </a:r>
+          </a:p>
+          <a:p>
+            <a:r>
+              <a:rPr lang="en-US" dirty="0"/>
+              <a:t>Homework : Exercise : Code the aforementioned program in Python or Java. </a:t>
+            </a:r>
+          </a:p>
+        </p:txBody>
+      </p:sp>
+    </p:spTree>
+    <p:extLst>
+      <p:ext uri="{BB962C8B-B14F-4D97-AF65-F5344CB8AC3E}">
+        <p14:creationId xmlns:p14="http://schemas.microsoft.com/office/powerpoint/2010/main" val="1456685527"/>
+      </p:ext>
+    </p:extLst>
+  </p:cSld>
+  <p:clrMapOvr>
+    <a:masterClrMapping/>
+  </p:clrMapOvr>
+</p:sld>
+</file>
+
+<file path=ppt/slides/slide27.xml><?xml version="1.0" encoding="utf-8"?>
+<p:sld xmlns:a="http://schemas.openxmlformats.org/drawingml/2006/main" xmlns:r="http://schemas.openxmlformats.org/officeDocument/2006/relationships" xmlns:p="http://schemas.openxmlformats.org/presentationml/2006/main">
+  <p:cSld>
+    <p:spTree>
+      <p:nvGrpSpPr>
+        <p:cNvPr id="1" name=""/>
+        <p:cNvGrpSpPr/>
+        <p:nvPr/>
+      </p:nvGrpSpPr>
+      <p:grpSpPr>
+        <a:xfrm>
+          <a:off x="0" y="0"/>
+          <a:ext cx="0" cy="0"/>
+          <a:chOff x="0" y="0"/>
+          <a:chExt cx="0" cy="0"/>
+        </a:xfrm>
+      </p:grpSpPr>
+      <p:sp>
+        <p:nvSpPr>
+          <p:cNvPr id="2" name="Title 1">
+            <a:extLst>
+              <a:ext uri="{FF2B5EF4-FFF2-40B4-BE49-F238E27FC236}">
+                <a16:creationId xmlns:a16="http://schemas.microsoft.com/office/drawing/2014/main" id="{185A7964-9008-5F74-2214-DD2DBA01D87F}"/>
+              </a:ext>
+            </a:extLst>
+          </p:cNvPr>
+          <p:cNvSpPr>
+            <a:spLocks noGrp="1"/>
+          </p:cNvSpPr>
+          <p:nvPr>
+            <p:ph type="title"/>
+          </p:nvPr>
+        </p:nvSpPr>
+        <p:spPr/>
+        <p:txBody>
+          <a:bodyPr/>
+          <a:lstStyle/>
+          <a:p>
+            <a:endParaRPr lang="en-US"/>
+          </a:p>
+        </p:txBody>
+      </p:sp>
+      <p:sp>
+        <p:nvSpPr>
+          <p:cNvPr id="3" name="Content Placeholder 2">
+            <a:extLst>
+              <a:ext uri="{FF2B5EF4-FFF2-40B4-BE49-F238E27FC236}">
+                <a16:creationId xmlns:a16="http://schemas.microsoft.com/office/drawing/2014/main" id="{6FF02B0F-C4FD-C07E-125B-38FF871C24AA}"/>
+              </a:ext>
+            </a:extLst>
+          </p:cNvPr>
+          <p:cNvSpPr>
+            <a:spLocks noGrp="1"/>
+          </p:cNvSpPr>
+          <p:nvPr>
+            <p:ph idx="1"/>
+          </p:nvPr>
+        </p:nvSpPr>
+        <p:spPr/>
+        <p:txBody>
+          <a:bodyPr/>
+          <a:lstStyle/>
+          <a:p>
+            <a:endParaRPr lang="en-US"/>
+          </a:p>
+        </p:txBody>
+      </p:sp>
+    </p:spTree>
+    <p:extLst>
+      <p:ext uri="{BB962C8B-B14F-4D97-AF65-F5344CB8AC3E}">
+        <p14:creationId xmlns:p14="http://schemas.microsoft.com/office/powerpoint/2010/main" val="1304152625"/>
       </p:ext>
     </p:extLst>
   </p:cSld>
@@ -10480,20 +11204,20 @@
 </file>
 
 <file path=customXml/item1.xml><?xml version="1.0" encoding="utf-8"?>
+<p:properties xmlns:p="http://schemas.microsoft.com/office/2006/metadata/properties" xmlns:xsi="http://www.w3.org/2001/XMLSchema-instance" xmlns:pc="http://schemas.microsoft.com/office/infopath/2007/PartnerControls">
+  <documentManagement>
+    <MediaServiceKeyPoints xmlns="14f5a3ae-0bb3-48a0-b93b-c008bd975cba" xsi:nil="true"/>
+  </documentManagement>
+</p:properties>
+</file>
+
+<file path=customXml/item2.xml><?xml version="1.0" encoding="utf-8"?>
 <?mso-contentType ?>
 <FormTemplates xmlns="http://schemas.microsoft.com/sharepoint/v3/contenttype/forms">
   <Display>DocumentLibraryForm</Display>
   <Edit>DocumentLibraryForm</Edit>
   <New>DocumentLibraryForm</New>
 </FormTemplates>
-</file>
-
-<file path=customXml/item2.xml><?xml version="1.0" encoding="utf-8"?>
-<p:properties xmlns:p="http://schemas.microsoft.com/office/2006/metadata/properties" xmlns:xsi="http://www.w3.org/2001/XMLSchema-instance" xmlns:pc="http://schemas.microsoft.com/office/infopath/2007/PartnerControls">
-  <documentManagement>
-    <MediaServiceKeyPoints xmlns="14f5a3ae-0bb3-48a0-b93b-c008bd975cba" xsi:nil="true"/>
-  </documentManagement>
-</p:properties>
 </file>
 
 <file path=customXml/item3.xml><?xml version="1.0" encoding="utf-8"?>
@@ -10643,14 +11367,6 @@
 </file>
 
 <file path=customXml/itemProps1.xml><?xml version="1.0" encoding="utf-8"?>
-<ds:datastoreItem xmlns:ds="http://schemas.openxmlformats.org/officeDocument/2006/customXml" ds:itemID="{64B270AB-C138-415C-897E-3C24487DECF1}">
-  <ds:schemaRefs>
-    <ds:schemaRef ds:uri="http://schemas.microsoft.com/sharepoint/v3/contenttype/forms"/>
-  </ds:schemaRefs>
-</ds:datastoreItem>
-</file>
-
-<file path=customXml/itemProps2.xml><?xml version="1.0" encoding="utf-8"?>
 <ds:datastoreItem xmlns:ds="http://schemas.openxmlformats.org/officeDocument/2006/customXml" ds:itemID="{2C4C00F4-06E9-43E3-AD97-88A857CEFA82}">
   <ds:schemaRefs>
     <ds:schemaRef ds:uri="http://schemas.openxmlformats.org/package/2006/metadata/core-properties"/>
@@ -10662,6 +11378,14 @@
     <ds:schemaRef ds:uri="http://schemas.microsoft.com/office/infopath/2007/PartnerControls"/>
     <ds:schemaRef ds:uri="14f5a3ae-0bb3-48a0-b93b-c008bd975cba"/>
     <ds:schemaRef ds:uri="http://schemas.microsoft.com/office/2006/metadata/properties"/>
+  </ds:schemaRefs>
+</ds:datastoreItem>
+</file>
+
+<file path=customXml/itemProps2.xml><?xml version="1.0" encoding="utf-8"?>
+<ds:datastoreItem xmlns:ds="http://schemas.openxmlformats.org/officeDocument/2006/customXml" ds:itemID="{64B270AB-C138-415C-897E-3C24487DECF1}">
+  <ds:schemaRefs>
+    <ds:schemaRef ds:uri="http://schemas.microsoft.com/sharepoint/v3/contenttype/forms"/>
   </ds:schemaRefs>
 </ds:datastoreItem>
 </file>

</xml_diff>